<commit_message>
YT SB1, PPT SB1 minor change
</commit_message>
<xml_diff>
--- a/Submission1/Slide.pptx
+++ b/Submission1/Slide.pptx
@@ -917,7 +917,7 @@
   <p:cSld>
     <p:spTree>
       <p:nvGrpSpPr>
-        <p:cNvPr id="168" name="Shape 168"/>
+        <p:cNvPr id="169" name="Shape 169"/>
         <p:cNvGrpSpPr/>
         <p:nvPr/>
       </p:nvGrpSpPr>
@@ -931,7 +931,7 @@
       </p:grpSpPr>
       <p:sp>
         <p:nvSpPr>
-          <p:cNvPr id="169" name="Google Shape;169;g2a8b3ec7f8a_0_131:notes"/>
+          <p:cNvPr id="170" name="Google Shape;170;g2a8b3ec7f8a_0_131:notes"/>
           <p:cNvSpPr/>
           <p:nvPr>
             <p:ph idx="2" type="sldImg"/>
@@ -966,7 +966,7 @@
       </p:sp>
       <p:sp>
         <p:nvSpPr>
-          <p:cNvPr id="170" name="Google Shape;170;g2a8b3ec7f8a_0_131:notes"/>
+          <p:cNvPr id="171" name="Google Shape;171;g2a8b3ec7f8a_0_131:notes"/>
           <p:cNvSpPr txBox="1"/>
           <p:nvPr>
             <p:ph idx="1" type="body"/>
@@ -1016,7 +1016,7 @@
   <p:cSld>
     <p:spTree>
       <p:nvGrpSpPr>
-        <p:cNvPr id="175" name="Shape 175"/>
+        <p:cNvPr id="176" name="Shape 176"/>
         <p:cNvGrpSpPr/>
         <p:nvPr/>
       </p:nvGrpSpPr>
@@ -1030,7 +1030,7 @@
       </p:grpSpPr>
       <p:sp>
         <p:nvSpPr>
-          <p:cNvPr id="176" name="Google Shape;176;g2a8b3ec7f8a_0_91:notes"/>
+          <p:cNvPr id="177" name="Google Shape;177;g2a8b3ec7f8a_0_91:notes"/>
           <p:cNvSpPr/>
           <p:nvPr>
             <p:ph idx="2" type="sldImg"/>
@@ -1065,7 +1065,7 @@
       </p:sp>
       <p:sp>
         <p:nvSpPr>
-          <p:cNvPr id="177" name="Google Shape;177;g2a8b3ec7f8a_0_91:notes"/>
+          <p:cNvPr id="178" name="Google Shape;178;g2a8b3ec7f8a_0_91:notes"/>
           <p:cNvSpPr txBox="1"/>
           <p:nvPr>
             <p:ph idx="1" type="body"/>
@@ -1115,7 +1115,7 @@
   <p:cSld>
     <p:spTree>
       <p:nvGrpSpPr>
-        <p:cNvPr id="182" name="Shape 182"/>
+        <p:cNvPr id="184" name="Shape 184"/>
         <p:cNvGrpSpPr/>
         <p:nvPr/>
       </p:nvGrpSpPr>
@@ -1129,7 +1129,7 @@
       </p:grpSpPr>
       <p:sp>
         <p:nvSpPr>
-          <p:cNvPr id="183" name="Google Shape;183;g2a8b3ec7f8a_0_86:notes"/>
+          <p:cNvPr id="185" name="Google Shape;185;g2a8b3ec7f8a_0_86:notes"/>
           <p:cNvSpPr/>
           <p:nvPr>
             <p:ph idx="2" type="sldImg"/>
@@ -1164,7 +1164,7 @@
       </p:sp>
       <p:sp>
         <p:nvSpPr>
-          <p:cNvPr id="184" name="Google Shape;184;g2a8b3ec7f8a_0_86:notes"/>
+          <p:cNvPr id="186" name="Google Shape;186;g2a8b3ec7f8a_0_86:notes"/>
           <p:cNvSpPr txBox="1"/>
           <p:nvPr>
             <p:ph idx="1" type="body"/>
@@ -1214,7 +1214,7 @@
   <p:cSld>
     <p:spTree>
       <p:nvGrpSpPr>
-        <p:cNvPr id="190" name="Shape 190"/>
+        <p:cNvPr id="192" name="Shape 192"/>
         <p:cNvGrpSpPr/>
         <p:nvPr/>
       </p:nvGrpSpPr>
@@ -1228,7 +1228,7 @@
       </p:grpSpPr>
       <p:sp>
         <p:nvSpPr>
-          <p:cNvPr id="191" name="Google Shape;191;g2a8b3ec7f8a_0_81:notes"/>
+          <p:cNvPr id="193" name="Google Shape;193;g2a8b3ec7f8a_0_81:notes"/>
           <p:cNvSpPr/>
           <p:nvPr>
             <p:ph idx="2" type="sldImg"/>
@@ -1263,7 +1263,7 @@
       </p:sp>
       <p:sp>
         <p:nvSpPr>
-          <p:cNvPr id="192" name="Google Shape;192;g2a8b3ec7f8a_0_81:notes"/>
+          <p:cNvPr id="194" name="Google Shape;194;g2a8b3ec7f8a_0_81:notes"/>
           <p:cNvSpPr txBox="1"/>
           <p:nvPr>
             <p:ph idx="1" type="body"/>
@@ -1313,7 +1313,7 @@
   <p:cSld>
     <p:spTree>
       <p:nvGrpSpPr>
-        <p:cNvPr id="197" name="Shape 197"/>
+        <p:cNvPr id="199" name="Shape 199"/>
         <p:cNvGrpSpPr/>
         <p:nvPr/>
       </p:nvGrpSpPr>
@@ -1327,7 +1327,7 @@
       </p:grpSpPr>
       <p:sp>
         <p:nvSpPr>
-          <p:cNvPr id="198" name="Google Shape;198;g2a8b3ec7f8a_0_220:notes"/>
+          <p:cNvPr id="200" name="Google Shape;200;g2a8b3ec7f8a_0_220:notes"/>
           <p:cNvSpPr/>
           <p:nvPr>
             <p:ph idx="2" type="sldImg"/>
@@ -1362,7 +1362,7 @@
       </p:sp>
       <p:sp>
         <p:nvSpPr>
-          <p:cNvPr id="199" name="Google Shape;199;g2a8b3ec7f8a_0_220:notes"/>
+          <p:cNvPr id="201" name="Google Shape;201;g2a8b3ec7f8a_0_220:notes"/>
           <p:cNvSpPr txBox="1"/>
           <p:nvPr>
             <p:ph idx="1" type="body"/>
@@ -1412,7 +1412,7 @@
   <p:cSld>
     <p:spTree>
       <p:nvGrpSpPr>
-        <p:cNvPr id="204" name="Shape 204"/>
+        <p:cNvPr id="206" name="Shape 206"/>
         <p:cNvGrpSpPr/>
         <p:nvPr/>
       </p:nvGrpSpPr>
@@ -1426,7 +1426,7 @@
       </p:grpSpPr>
       <p:sp>
         <p:nvSpPr>
-          <p:cNvPr id="205" name="Google Shape;205;g2a8b3ec7f8a_0_155:notes"/>
+          <p:cNvPr id="207" name="Google Shape;207;g2a8b3ec7f8a_0_155:notes"/>
           <p:cNvSpPr/>
           <p:nvPr>
             <p:ph idx="2" type="sldImg"/>
@@ -1461,7 +1461,7 @@
       </p:sp>
       <p:sp>
         <p:nvSpPr>
-          <p:cNvPr id="206" name="Google Shape;206;g2a8b3ec7f8a_0_155:notes"/>
+          <p:cNvPr id="208" name="Google Shape;208;g2a8b3ec7f8a_0_155:notes"/>
           <p:cNvSpPr txBox="1"/>
           <p:nvPr>
             <p:ph idx="1" type="body"/>
@@ -1511,7 +1511,7 @@
   <p:cSld>
     <p:spTree>
       <p:nvGrpSpPr>
-        <p:cNvPr id="211" name="Shape 211"/>
+        <p:cNvPr id="213" name="Shape 213"/>
         <p:cNvGrpSpPr/>
         <p:nvPr/>
       </p:nvGrpSpPr>
@@ -1525,7 +1525,7 @@
       </p:grpSpPr>
       <p:sp>
         <p:nvSpPr>
-          <p:cNvPr id="212" name="Google Shape;212;g2a8b3ec7f8a_0_161:notes"/>
+          <p:cNvPr id="214" name="Google Shape;214;g2a8b3ec7f8a_0_161:notes"/>
           <p:cNvSpPr/>
           <p:nvPr>
             <p:ph idx="2" type="sldImg"/>
@@ -1560,7 +1560,7 @@
       </p:sp>
       <p:sp>
         <p:nvSpPr>
-          <p:cNvPr id="213" name="Google Shape;213;g2a8b3ec7f8a_0_161:notes"/>
+          <p:cNvPr id="215" name="Google Shape;215;g2a8b3ec7f8a_0_161:notes"/>
           <p:cNvSpPr txBox="1"/>
           <p:nvPr>
             <p:ph idx="1" type="body"/>
@@ -1610,7 +1610,7 @@
   <p:cSld>
     <p:spTree>
       <p:nvGrpSpPr>
-        <p:cNvPr id="218" name="Shape 218"/>
+        <p:cNvPr id="220" name="Shape 220"/>
         <p:cNvGrpSpPr/>
         <p:nvPr/>
       </p:nvGrpSpPr>
@@ -1624,7 +1624,7 @@
       </p:grpSpPr>
       <p:sp>
         <p:nvSpPr>
-          <p:cNvPr id="219" name="Google Shape;219;g2a8b3ec7f8a_0_167:notes"/>
+          <p:cNvPr id="221" name="Google Shape;221;g2a8b3ec7f8a_0_167:notes"/>
           <p:cNvSpPr/>
           <p:nvPr>
             <p:ph idx="2" type="sldImg"/>
@@ -1659,7 +1659,7 @@
       </p:sp>
       <p:sp>
         <p:nvSpPr>
-          <p:cNvPr id="220" name="Google Shape;220;g2a8b3ec7f8a_0_167:notes"/>
+          <p:cNvPr id="222" name="Google Shape;222;g2a8b3ec7f8a_0_167:notes"/>
           <p:cNvSpPr txBox="1"/>
           <p:nvPr>
             <p:ph idx="1" type="body"/>
@@ -1709,7 +1709,7 @@
   <p:cSld>
     <p:spTree>
       <p:nvGrpSpPr>
-        <p:cNvPr id="225" name="Shape 225"/>
+        <p:cNvPr id="227" name="Shape 227"/>
         <p:cNvGrpSpPr/>
         <p:nvPr/>
       </p:nvGrpSpPr>
@@ -1723,7 +1723,7 @@
       </p:grpSpPr>
       <p:sp>
         <p:nvSpPr>
-          <p:cNvPr id="226" name="Google Shape;226;g2a8b3ec7f8a_0_173:notes"/>
+          <p:cNvPr id="228" name="Google Shape;228;g2a8b3ec7f8a_0_173:notes"/>
           <p:cNvSpPr/>
           <p:nvPr>
             <p:ph idx="2" type="sldImg"/>
@@ -1758,7 +1758,7 @@
       </p:sp>
       <p:sp>
         <p:nvSpPr>
-          <p:cNvPr id="227" name="Google Shape;227;g2a8b3ec7f8a_0_173:notes"/>
+          <p:cNvPr id="229" name="Google Shape;229;g2a8b3ec7f8a_0_173:notes"/>
           <p:cNvSpPr txBox="1"/>
           <p:nvPr>
             <p:ph idx="1" type="body"/>
@@ -1907,7 +1907,7 @@
   <p:cSld>
     <p:spTree>
       <p:nvGrpSpPr>
-        <p:cNvPr id="232" name="Shape 232"/>
+        <p:cNvPr id="234" name="Shape 234"/>
         <p:cNvGrpSpPr/>
         <p:nvPr/>
       </p:nvGrpSpPr>
@@ -1921,7 +1921,7 @@
       </p:grpSpPr>
       <p:sp>
         <p:nvSpPr>
-          <p:cNvPr id="233" name="Google Shape;233;g2a8b3ec7f8a_0_179:notes"/>
+          <p:cNvPr id="235" name="Google Shape;235;g2a8b3ec7f8a_0_179:notes"/>
           <p:cNvSpPr/>
           <p:nvPr>
             <p:ph idx="2" type="sldImg"/>
@@ -1956,7 +1956,7 @@
       </p:sp>
       <p:sp>
         <p:nvSpPr>
-          <p:cNvPr id="234" name="Google Shape;234;g2a8b3ec7f8a_0_179:notes"/>
+          <p:cNvPr id="236" name="Google Shape;236;g2a8b3ec7f8a_0_179:notes"/>
           <p:cNvSpPr txBox="1"/>
           <p:nvPr>
             <p:ph idx="1" type="body"/>
@@ -9755,8 +9755,8 @@
         </p:nvSpPr>
         <p:spPr>
           <a:xfrm>
-            <a:off x="598100" y="1392365"/>
-            <a:ext cx="8222100" cy="3258900"/>
+            <a:off x="598100" y="1217651"/>
+            <a:ext cx="8222100" cy="2010600"/>
           </a:xfrm>
           <a:prstGeom prst="rect">
             <a:avLst/>
@@ -9764,81 +9764,11 @@
         </p:spPr>
         <p:txBody>
           <a:bodyPr anchorCtr="0" anchor="t" bIns="91425" lIns="91425" spcFirstLastPara="1" rIns="91425" wrap="square" tIns="91425">
-            <a:normAutofit/>
+            <a:normAutofit lnSpcReduction="10000"/>
           </a:bodyPr>
           <a:lstStyle/>
           <a:p>
-            <a:pPr indent="-342900" lvl="0" marL="457200" rtl="0" algn="l">
-              <a:lnSpc>
-                <a:spcPct val="115000"/>
-              </a:lnSpc>
-              <a:spcBef>
-                <a:spcPts val="0"/>
-              </a:spcBef>
-              <a:spcAft>
-                <a:spcPts val="0"/>
-              </a:spcAft>
-              <a:buSzPts val="1800"/>
-              <a:buChar char="●"/>
-            </a:pPr>
-            <a:r>
-              <a:rPr lang="en" sz="1800"/>
-              <a:t>Dataset: Utilized the Amazon 5-core Movies and TV dataset (2018) for robust analysis.</a:t>
-            </a:r>
-            <a:endParaRPr sz="1800"/>
-          </a:p>
-          <a:p>
-            <a:pPr indent="-342900" lvl="0" marL="457200" rtl="0" algn="l">
-              <a:lnSpc>
-                <a:spcPct val="115000"/>
-              </a:lnSpc>
-              <a:spcBef>
-                <a:spcPts val="0"/>
-              </a:spcBef>
-              <a:spcAft>
-                <a:spcPts val="0"/>
-              </a:spcAft>
-              <a:buSzPts val="1800"/>
-              <a:buChar char="●"/>
-            </a:pPr>
-            <a:r>
-              <a:rPr lang="en" sz="1800"/>
-              <a:t>Approach: Combined Biased SVD with NLP techniques, integrating sentiment analysis for a comprehensive understanding of user-item interactions.</a:t>
-            </a:r>
-            <a:endParaRPr sz="1800"/>
-          </a:p>
-          <a:p>
-            <a:pPr indent="-342900" lvl="0" marL="457200" rtl="0" algn="l">
-              <a:lnSpc>
-                <a:spcPct val="115000"/>
-              </a:lnSpc>
-              <a:spcBef>
-                <a:spcPts val="0"/>
-              </a:spcBef>
-              <a:spcAft>
-                <a:spcPts val="0"/>
-              </a:spcAft>
-              <a:buSzPts val="1800"/>
-              <a:buChar char="●"/>
-            </a:pPr>
-            <a:r>
-              <a:rPr lang="en" sz="1800"/>
-              <a:t>Model Improvements: Introduced Biased SVD (ratings only) and Biased SVD (ratings + sentiment).</a:t>
-            </a:r>
-            <a:endParaRPr sz="1800">
-              <a:solidFill>
-                <a:srgbClr val="D1D5DB"/>
-              </a:solidFill>
-              <a:highlight>
-                <a:srgbClr val="343541"/>
-              </a:highlight>
-            </a:endParaRPr>
-          </a:p>
-          <a:p>
             <a:pPr indent="0" lvl="0" marL="0" rtl="0" algn="l">
-              <a:lnSpc>
-                <a:spcPct val="115000"/>
-              </a:lnSpc>
               <a:spcBef>
                 <a:spcPts val="0"/>
               </a:spcBef>
@@ -9850,14 +9780,107 @@
             <a:r>
               <a:t/>
             </a:r>
-            <a:endParaRPr sz="1200">
-              <a:solidFill>
-                <a:srgbClr val="D1D5DB"/>
-              </a:solidFill>
-              <a:highlight>
-                <a:srgbClr val="343541"/>
-              </a:highlight>
-            </a:endParaRPr>
+            <a:endParaRPr sz="1900"/>
+          </a:p>
+          <a:p>
+            <a:pPr indent="-349250" lvl="0" marL="457200" rtl="0" algn="l">
+              <a:spcBef>
+                <a:spcPts val="0"/>
+              </a:spcBef>
+              <a:spcAft>
+                <a:spcPts val="0"/>
+              </a:spcAft>
+              <a:buSzPts val="1900"/>
+              <a:buChar char="●"/>
+            </a:pPr>
+            <a:r>
+              <a:rPr lang="en" sz="1900"/>
+              <a:t>Approach: Combined Biased SVD with NLP techniques</a:t>
+            </a:r>
+            <a:endParaRPr sz="1900"/>
+          </a:p>
+          <a:p>
+            <a:pPr indent="-349250" lvl="0" marL="457200" rtl="0" algn="l">
+              <a:spcBef>
+                <a:spcPts val="0"/>
+              </a:spcBef>
+              <a:spcAft>
+                <a:spcPts val="0"/>
+              </a:spcAft>
+              <a:buSzPts val="1900"/>
+              <a:buChar char="●"/>
+            </a:pPr>
+            <a:r>
+              <a:rPr lang="en" sz="1900"/>
+              <a:t>Bias-SVD Models</a:t>
+            </a:r>
+            <a:endParaRPr sz="1900"/>
+          </a:p>
+          <a:p>
+            <a:pPr indent="-349250" lvl="1" marL="914400" rtl="0" algn="l">
+              <a:spcBef>
+                <a:spcPts val="0"/>
+              </a:spcBef>
+              <a:spcAft>
+                <a:spcPts val="0"/>
+              </a:spcAft>
+              <a:buSzPts val="1900"/>
+              <a:buChar char="○"/>
+            </a:pPr>
+            <a:r>
+              <a:rPr lang="en" sz="1900"/>
+              <a:t>SVD (ratings only) </a:t>
+            </a:r>
+            <a:endParaRPr sz="1900"/>
+          </a:p>
+          <a:p>
+            <a:pPr indent="-349250" lvl="1" marL="914400" rtl="0" algn="l">
+              <a:spcBef>
+                <a:spcPts val="0"/>
+              </a:spcBef>
+              <a:spcAft>
+                <a:spcPts val="0"/>
+              </a:spcAft>
+              <a:buSzPts val="1900"/>
+              <a:buChar char="○"/>
+            </a:pPr>
+            <a:r>
+              <a:rPr lang="en" sz="1900"/>
+              <a:t>Biased SVD (ratings + sentiment)</a:t>
+            </a:r>
+            <a:endParaRPr sz="1900"/>
+          </a:p>
+          <a:p>
+            <a:pPr indent="-349250" lvl="0" marL="457200" rtl="0" algn="l">
+              <a:spcBef>
+                <a:spcPts val="0"/>
+              </a:spcBef>
+              <a:spcAft>
+                <a:spcPts val="0"/>
+              </a:spcAft>
+              <a:buSzPts val="1900"/>
+              <a:buChar char="●"/>
+            </a:pPr>
+            <a:r>
+              <a:rPr lang="en" sz="1900"/>
+              <a:t>Sequential Model</a:t>
+            </a:r>
+            <a:endParaRPr sz="1900"/>
+          </a:p>
+          <a:p>
+            <a:pPr indent="0" lvl="0" marL="0" rtl="0" algn="l">
+              <a:spcBef>
+                <a:spcPts val="0"/>
+              </a:spcBef>
+              <a:spcAft>
+                <a:spcPts val="0"/>
+              </a:spcAft>
+              <a:buNone/>
+            </a:pPr>
+            <a:r>
+              <a:t/>
+            </a:r>
+            <a:endParaRPr sz="1900"/>
           </a:p>
         </p:txBody>
       </p:sp>
@@ -9901,6 +9924,34 @@
           </a:p>
         </p:txBody>
       </p:sp>
+      <p:pic>
+        <p:nvPicPr>
+          <p:cNvPr id="168" name="Google Shape;168;p22"/>
+          <p:cNvPicPr preferRelativeResize="0"/>
+          <p:nvPr/>
+        </p:nvPicPr>
+        <p:blipFill>
+          <a:blip r:embed="rId3">
+            <a:alphaModFix/>
+          </a:blip>
+          <a:stretch>
+            <a:fillRect/>
+          </a:stretch>
+        </p:blipFill>
+        <p:spPr>
+          <a:xfrm>
+            <a:off x="5006350" y="2924101"/>
+            <a:ext cx="3454085" cy="1610449"/>
+          </a:xfrm>
+          <a:prstGeom prst="rect">
+            <a:avLst/>
+          </a:prstGeom>
+          <a:noFill/>
+          <a:ln>
+            <a:noFill/>
+          </a:ln>
+        </p:spPr>
+      </p:pic>
     </p:spTree>
   </p:cSld>
   <p:clrMapOvr>
@@ -9914,7 +9965,7 @@
   <p:cSld>
     <p:spTree>
       <p:nvGrpSpPr>
-        <p:cNvPr id="171" name="Shape 171"/>
+        <p:cNvPr id="172" name="Shape 172"/>
         <p:cNvGrpSpPr/>
         <p:nvPr/>
       </p:nvGrpSpPr>
@@ -9928,7 +9979,7 @@
       </p:grpSpPr>
       <p:sp>
         <p:nvSpPr>
-          <p:cNvPr id="172" name="Google Shape;172;p23"/>
+          <p:cNvPr id="173" name="Google Shape;173;p23"/>
           <p:cNvSpPr txBox="1"/>
           <p:nvPr>
             <p:ph idx="12" type="sldNum"/>
@@ -9968,7 +10019,7 @@
       </p:sp>
       <p:sp>
         <p:nvSpPr>
-          <p:cNvPr id="173" name="Google Shape;173;p23"/>
+          <p:cNvPr id="174" name="Google Shape;174;p23"/>
           <p:cNvSpPr txBox="1"/>
           <p:nvPr>
             <p:ph type="ctrTitle"/>
@@ -10008,7 +10059,7 @@
       </p:sp>
       <p:sp>
         <p:nvSpPr>
-          <p:cNvPr id="174" name="Google Shape;174;p23"/>
+          <p:cNvPr id="175" name="Google Shape;175;p23"/>
           <p:cNvSpPr/>
           <p:nvPr/>
         </p:nvSpPr>
@@ -10090,7 +10141,7 @@
   <p:cSld>
     <p:spTree>
       <p:nvGrpSpPr>
-        <p:cNvPr id="178" name="Shape 178"/>
+        <p:cNvPr id="179" name="Shape 179"/>
         <p:cNvGrpSpPr/>
         <p:nvPr/>
       </p:nvGrpSpPr>
@@ -10104,7 +10155,7 @@
       </p:grpSpPr>
       <p:sp>
         <p:nvSpPr>
-          <p:cNvPr id="179" name="Google Shape;179;p24"/>
+          <p:cNvPr id="180" name="Google Shape;180;p24"/>
           <p:cNvSpPr txBox="1"/>
           <p:nvPr>
             <p:ph type="ctrTitle"/>
@@ -10144,7 +10195,7 @@
       </p:sp>
       <p:sp>
         <p:nvSpPr>
-          <p:cNvPr id="180" name="Google Shape;180;p24"/>
+          <p:cNvPr id="181" name="Google Shape;181;p24"/>
           <p:cNvSpPr txBox="1"/>
           <p:nvPr>
             <p:ph idx="1" type="subTitle"/>
@@ -10152,8 +10203,8 @@
         </p:nvSpPr>
         <p:spPr>
           <a:xfrm>
-            <a:off x="598100" y="1417115"/>
-            <a:ext cx="8222100" cy="3234000"/>
+            <a:off x="598100" y="1141375"/>
+            <a:ext cx="7262400" cy="2237700"/>
           </a:xfrm>
           <a:prstGeom prst="rect">
             <a:avLst/>
@@ -10161,13 +10212,13 @@
         </p:spPr>
         <p:txBody>
           <a:bodyPr anchorCtr="0" anchor="t" bIns="91425" lIns="91425" spcFirstLastPara="1" rIns="91425" wrap="square" tIns="91425">
-            <a:normAutofit fontScale="85000"/>
+            <a:noAutofit/>
           </a:bodyPr>
           <a:lstStyle/>
           <a:p>
             <a:pPr indent="0" lvl="0" marL="0" rtl="0" algn="l">
               <a:lnSpc>
-                <a:spcPct val="150000"/>
+                <a:spcPct val="115000"/>
               </a:lnSpc>
               <a:spcBef>
                 <a:spcPts val="0"/>
@@ -10175,18 +10226,19 @@
               <a:spcAft>
                 <a:spcPts val="0"/>
               </a:spcAft>
+              <a:buSzPts val="789"/>
               <a:buNone/>
             </a:pPr>
             <a:r>
-              <a:rPr lang="en"/>
-              <a:t>Utilizing the Amazon 5-core Movies and TV dataset from 2018 provides a solid foundation for robust analysis, ensuring the reliability and consistency of the results.</a:t>
+              <a:rPr lang="en" sz="1800"/>
+              <a:t>Datasets: Amazon 5-core Movies and TV dataset from 2018 comprising 3,410,019 reviews</a:t>
             </a:r>
-            <a:endParaRPr/>
+            <a:endParaRPr sz="1800"/>
           </a:p>
           <a:p>
             <a:pPr indent="0" lvl="0" marL="0" rtl="0" algn="l">
               <a:lnSpc>
-                <a:spcPct val="150000"/>
+                <a:spcPct val="115000"/>
               </a:lnSpc>
               <a:spcBef>
                 <a:spcPts val="0"/>
@@ -10194,17 +10246,18 @@
               <a:spcAft>
                 <a:spcPts val="0"/>
               </a:spcAft>
+              <a:buSzPts val="789"/>
               <a:buNone/>
             </a:pPr>
             <a:r>
               <a:t/>
             </a:r>
-            <a:endParaRPr/>
+            <a:endParaRPr sz="1800"/>
           </a:p>
           <a:p>
             <a:pPr indent="0" lvl="0" marL="0" rtl="0" algn="l">
               <a:lnSpc>
-                <a:spcPct val="150000"/>
+                <a:spcPct val="115000"/>
               </a:lnSpc>
               <a:spcBef>
                 <a:spcPts val="0"/>
@@ -10215,27 +10268,20 @@
               <a:buClr>
                 <a:srgbClr val="D1D5DB"/>
               </a:buClr>
-              <a:buSzPct val="100000"/>
+              <a:buSzPts val="860"/>
               <a:buFont typeface="Roboto"/>
               <a:buNone/>
             </a:pPr>
             <a:r>
-              <a:rPr lang="en"/>
-              <a:t>Findings: The experimental results demonstrate that biased models, especially the Ratings SVD, outperform the baseline Simon Funk SVD model. This not only showcases enhanced performance but also faster convergence times.</a:t>
+              <a:rPr lang="en" sz="1800"/>
+              <a:t>Results:</a:t>
             </a:r>
-            <a:endParaRPr sz="1200">
-              <a:solidFill>
-                <a:srgbClr val="D1D5DB"/>
-              </a:solidFill>
-              <a:highlight>
-                <a:srgbClr val="343541"/>
-              </a:highlight>
-            </a:endParaRPr>
-          </a:p>
-          <a:p>
-            <a:pPr indent="0" lvl="0" marL="0" rtl="0" algn="l">
+            <a:endParaRPr sz="1800"/>
+          </a:p>
+          <a:p>
+            <a:pPr indent="-342900" lvl="0" marL="457200" rtl="0" algn="l">
               <a:lnSpc>
-                <a:spcPct val="150000"/>
+                <a:spcPct val="115000"/>
               </a:lnSpc>
               <a:spcBef>
                 <a:spcPts val="0"/>
@@ -10243,25 +10289,82 @@
               <a:spcAft>
                 <a:spcPts val="0"/>
               </a:spcAft>
+              <a:buSzPts val="1800"/>
+              <a:buChar char="●"/>
+            </a:pPr>
+            <a:r>
+              <a:rPr lang="en" sz="1800"/>
+              <a:t>Bias-SVD Models</a:t>
+            </a:r>
+            <a:endParaRPr sz="1800"/>
+          </a:p>
+          <a:p>
+            <a:pPr indent="-342900" lvl="1" marL="914400" rtl="0" algn="l">
+              <a:lnSpc>
+                <a:spcPct val="115000"/>
+              </a:lnSpc>
+              <a:spcBef>
+                <a:spcPts val="0"/>
+              </a:spcBef>
+              <a:spcAft>
+                <a:spcPts val="0"/>
+              </a:spcAft>
+              <a:buSzPts val="1800"/>
+              <a:buChar char="○"/>
+            </a:pPr>
+            <a:r>
+              <a:rPr lang="en" sz="1800"/>
+              <a:t>Simon Funk SVD model exhibited the poorest performance, with the longest convergence time</a:t>
+            </a:r>
+            <a:endParaRPr sz="1800"/>
+          </a:p>
+          <a:p>
+            <a:pPr indent="0" lvl="0" marL="457200" rtl="0" algn="l">
+              <a:lnSpc>
+                <a:spcPct val="115000"/>
+              </a:lnSpc>
+              <a:spcBef>
+                <a:spcPts val="0"/>
+              </a:spcBef>
+              <a:spcAft>
+                <a:spcPts val="0"/>
+              </a:spcAft>
+              <a:buSzPts val="852"/>
               <a:buNone/>
             </a:pPr>
             <a:r>
               <a:t/>
             </a:r>
-            <a:endParaRPr sz="1200">
-              <a:solidFill>
+            <a:endParaRPr sz="1800"/>
+          </a:p>
+          <a:p>
+            <a:pPr indent="0" lvl="0" marL="0" rtl="0" algn="l">
+              <a:lnSpc>
+                <a:spcPct val="115000"/>
+              </a:lnSpc>
+              <a:spcBef>
+                <a:spcPts val="0"/>
+              </a:spcBef>
+              <a:spcAft>
+                <a:spcPts val="0"/>
+              </a:spcAft>
+              <a:buClr>
                 <a:srgbClr val="D1D5DB"/>
-              </a:solidFill>
-              <a:highlight>
-                <a:srgbClr val="343541"/>
-              </a:highlight>
-            </a:endParaRPr>
+              </a:buClr>
+              <a:buSzPts val="860"/>
+              <a:buFont typeface="Roboto"/>
+              <a:buNone/>
+            </a:pPr>
+            <a:r>
+              <a:t/>
+            </a:r>
+            <a:endParaRPr sz="1800"/>
           </a:p>
         </p:txBody>
       </p:sp>
       <p:sp>
         <p:nvSpPr>
-          <p:cNvPr id="181" name="Google Shape;181;p24"/>
+          <p:cNvPr id="182" name="Google Shape;182;p24"/>
           <p:cNvSpPr txBox="1"/>
           <p:nvPr>
             <p:ph idx="12" type="sldNum"/>
@@ -10299,6 +10402,34 @@
           </a:p>
         </p:txBody>
       </p:sp>
+      <p:pic>
+        <p:nvPicPr>
+          <p:cNvPr id="183" name="Google Shape;183;p24"/>
+          <p:cNvPicPr preferRelativeResize="0"/>
+          <p:nvPr/>
+        </p:nvPicPr>
+        <p:blipFill>
+          <a:blip r:embed="rId3">
+            <a:alphaModFix/>
+          </a:blip>
+          <a:stretch>
+            <a:fillRect/>
+          </a:stretch>
+        </p:blipFill>
+        <p:spPr>
+          <a:xfrm>
+            <a:off x="1785812" y="3578834"/>
+            <a:ext cx="4886975" cy="1392692"/>
+          </a:xfrm>
+          <a:prstGeom prst="rect">
+            <a:avLst/>
+          </a:prstGeom>
+          <a:noFill/>
+          <a:ln>
+            <a:noFill/>
+          </a:ln>
+        </p:spPr>
+      </p:pic>
     </p:spTree>
   </p:cSld>
   <p:clrMapOvr>
@@ -10312,7 +10443,7 @@
   <p:cSld>
     <p:spTree>
       <p:nvGrpSpPr>
-        <p:cNvPr id="185" name="Shape 185"/>
+        <p:cNvPr id="187" name="Shape 187"/>
         <p:cNvGrpSpPr/>
         <p:nvPr/>
       </p:nvGrpSpPr>
@@ -10326,7 +10457,7 @@
       </p:grpSpPr>
       <p:sp>
         <p:nvSpPr>
-          <p:cNvPr id="186" name="Google Shape;186;p25"/>
+          <p:cNvPr id="188" name="Google Shape;188;p25"/>
           <p:cNvSpPr txBox="1"/>
           <p:nvPr>
             <p:ph type="ctrTitle"/>
@@ -10334,7 +10465,7 @@
         </p:nvSpPr>
         <p:spPr>
           <a:xfrm>
-            <a:off x="460950" y="229772"/>
+            <a:off x="513975" y="250972"/>
             <a:ext cx="8222100" cy="838800"/>
           </a:xfrm>
           <a:prstGeom prst="rect">
@@ -10357,16 +10488,16 @@
               <a:buNone/>
             </a:pPr>
             <a:r>
-              <a:rPr lang="en"/>
-              <a:t>Pictures of Result</a:t>
+              <a:rPr lang="en" sz="4000"/>
+              <a:t>Dataset and Results</a:t>
             </a:r>
-            <a:endParaRPr/>
+            <a:endParaRPr sz="3900"/>
           </a:p>
         </p:txBody>
       </p:sp>
       <p:sp>
         <p:nvSpPr>
-          <p:cNvPr id="187" name="Google Shape;187;p25"/>
+          <p:cNvPr id="189" name="Google Shape;189;p25"/>
           <p:cNvSpPr txBox="1"/>
           <p:nvPr>
             <p:ph idx="12" type="sldNum"/>
@@ -10406,7 +10537,7 @@
       </p:sp>
       <p:pic>
         <p:nvPicPr>
-          <p:cNvPr id="188" name="Google Shape;188;p25"/>
+          <p:cNvPr id="190" name="Google Shape;190;p25"/>
           <p:cNvPicPr preferRelativeResize="0"/>
           <p:nvPr/>
         </p:nvPicPr>
@@ -10420,8 +10551,8 @@
         </p:blipFill>
         <p:spPr>
           <a:xfrm>
-            <a:off x="2010750" y="1388509"/>
-            <a:ext cx="4886975" cy="1392692"/>
+            <a:off x="1820863" y="2926361"/>
+            <a:ext cx="4886976" cy="1588265"/>
           </a:xfrm>
           <a:prstGeom prst="rect">
             <a:avLst/>
@@ -10432,24 +10563,16 @@
           </a:ln>
         </p:spPr>
       </p:pic>
-      <p:pic>
-        <p:nvPicPr>
-          <p:cNvPr id="189" name="Google Shape;189;p25"/>
-          <p:cNvPicPr preferRelativeResize="0"/>
+      <p:sp>
+        <p:nvSpPr>
+          <p:cNvPr id="191" name="Google Shape;191;p25"/>
+          <p:cNvSpPr txBox="1"/>
           <p:nvPr/>
-        </p:nvPicPr>
-        <p:blipFill>
-          <a:blip r:embed="rId4">
-            <a:alphaModFix/>
-          </a:blip>
-          <a:stretch>
-            <a:fillRect/>
-          </a:stretch>
-        </p:blipFill>
-        <p:spPr>
-          <a:xfrm>
-            <a:off x="2010750" y="2959511"/>
-            <a:ext cx="4886976" cy="1588265"/>
+        </p:nvSpPr>
+        <p:spPr>
+          <a:xfrm>
+            <a:off x="604500" y="1213013"/>
+            <a:ext cx="7319700" cy="1367400"/>
           </a:xfrm>
           <a:prstGeom prst="rect">
             <a:avLst/>
@@ -10459,7 +10582,120 @@
             <a:noFill/>
           </a:ln>
         </p:spPr>
-      </p:pic>
+        <p:txBody>
+          <a:bodyPr anchorCtr="0" anchor="t" bIns="91425" lIns="91425" spcFirstLastPara="1" rIns="91425" wrap="square" tIns="91425">
+            <a:spAutoFit/>
+          </a:bodyPr>
+          <a:lstStyle/>
+          <a:p>
+            <a:pPr indent="-342900" lvl="0" marL="457200" rtl="0" algn="l">
+              <a:lnSpc>
+                <a:spcPct val="115000"/>
+              </a:lnSpc>
+              <a:spcBef>
+                <a:spcPts val="0"/>
+              </a:spcBef>
+              <a:spcAft>
+                <a:spcPts val="0"/>
+              </a:spcAft>
+              <a:buClr>
+                <a:schemeClr val="lt1"/>
+              </a:buClr>
+              <a:buSzPts val="1800"/>
+              <a:buFont typeface="Roboto"/>
+              <a:buChar char="●"/>
+            </a:pPr>
+            <a:r>
+              <a:rPr lang="en" sz="1800">
+                <a:solidFill>
+                  <a:schemeClr val="lt1"/>
+                </a:solidFill>
+                <a:latin typeface="Roboto"/>
+                <a:ea typeface="Roboto"/>
+                <a:cs typeface="Roboto"/>
+                <a:sym typeface="Roboto"/>
+              </a:rPr>
+              <a:t>Sequential Model</a:t>
+            </a:r>
+            <a:endParaRPr sz="1800">
+              <a:solidFill>
+                <a:schemeClr val="lt1"/>
+              </a:solidFill>
+              <a:latin typeface="Roboto"/>
+              <a:ea typeface="Roboto"/>
+              <a:cs typeface="Roboto"/>
+              <a:sym typeface="Roboto"/>
+            </a:endParaRPr>
+          </a:p>
+          <a:p>
+            <a:pPr indent="-342900" lvl="1" marL="914400" rtl="0" algn="l">
+              <a:lnSpc>
+                <a:spcPct val="115000"/>
+              </a:lnSpc>
+              <a:spcBef>
+                <a:spcPts val="0"/>
+              </a:spcBef>
+              <a:spcAft>
+                <a:spcPts val="0"/>
+              </a:spcAft>
+              <a:buClr>
+                <a:schemeClr val="lt1"/>
+              </a:buClr>
+              <a:buSzPts val="1800"/>
+              <a:buFont typeface="Roboto"/>
+              <a:buChar char="○"/>
+            </a:pPr>
+            <a:r>
+              <a:rPr lang="en" sz="1800">
+                <a:solidFill>
+                  <a:schemeClr val="lt1"/>
+                </a:solidFill>
+                <a:latin typeface="Roboto"/>
+                <a:ea typeface="Roboto"/>
+                <a:cs typeface="Roboto"/>
+                <a:sym typeface="Roboto"/>
+              </a:rPr>
+              <a:t>FPMC outperforms GRU4Rec and SLi-REC on Amazon 5-core Movies and TV dataset</a:t>
+            </a:r>
+            <a:endParaRPr sz="1800">
+              <a:solidFill>
+                <a:schemeClr val="lt1"/>
+              </a:solidFill>
+              <a:latin typeface="Roboto"/>
+              <a:ea typeface="Roboto"/>
+              <a:cs typeface="Roboto"/>
+              <a:sym typeface="Roboto"/>
+            </a:endParaRPr>
+          </a:p>
+          <a:p>
+            <a:pPr indent="0" lvl="0" marL="457200" rtl="0" algn="l">
+              <a:lnSpc>
+                <a:spcPct val="80000"/>
+              </a:lnSpc>
+              <a:spcBef>
+                <a:spcPts val="0"/>
+              </a:spcBef>
+              <a:spcAft>
+                <a:spcPts val="0"/>
+              </a:spcAft>
+              <a:buNone/>
+            </a:pPr>
+            <a:r>
+              <a:rPr lang="en" sz="1842">
+                <a:solidFill>
+                  <a:schemeClr val="lt1"/>
+                </a:solidFill>
+                <a:latin typeface="Roboto"/>
+                <a:ea typeface="Roboto"/>
+                <a:cs typeface="Roboto"/>
+                <a:sym typeface="Roboto"/>
+              </a:rPr>
+              <a:t>.</a:t>
+            </a:r>
+            <a:endParaRPr/>
+          </a:p>
+        </p:txBody>
+      </p:sp>
     </p:spTree>
   </p:cSld>
   <p:clrMapOvr>
@@ -10473,7 +10709,7 @@
   <p:cSld>
     <p:spTree>
       <p:nvGrpSpPr>
-        <p:cNvPr id="193" name="Shape 193"/>
+        <p:cNvPr id="195" name="Shape 195"/>
         <p:cNvGrpSpPr/>
         <p:nvPr/>
       </p:nvGrpSpPr>
@@ -10487,7 +10723,7 @@
       </p:grpSpPr>
       <p:sp>
         <p:nvSpPr>
-          <p:cNvPr id="194" name="Google Shape;194;p26"/>
+          <p:cNvPr id="196" name="Google Shape;196;p26"/>
           <p:cNvSpPr txBox="1"/>
           <p:nvPr>
             <p:ph idx="12" type="sldNum"/>
@@ -10527,7 +10763,7 @@
       </p:sp>
       <p:sp>
         <p:nvSpPr>
-          <p:cNvPr id="195" name="Google Shape;195;p26"/>
+          <p:cNvPr id="197" name="Google Shape;197;p26"/>
           <p:cNvSpPr txBox="1"/>
           <p:nvPr>
             <p:ph type="ctrTitle"/>
@@ -10567,7 +10803,7 @@
       </p:sp>
       <p:sp>
         <p:nvSpPr>
-          <p:cNvPr id="196" name="Google Shape;196;p26"/>
+          <p:cNvPr id="198" name="Google Shape;198;p26"/>
           <p:cNvSpPr/>
           <p:nvPr/>
         </p:nvSpPr>
@@ -10649,7 +10885,7 @@
   <p:cSld>
     <p:spTree>
       <p:nvGrpSpPr>
-        <p:cNvPr id="200" name="Shape 200"/>
+        <p:cNvPr id="202" name="Shape 202"/>
         <p:cNvGrpSpPr/>
         <p:nvPr/>
       </p:nvGrpSpPr>
@@ -10663,7 +10899,7 @@
       </p:grpSpPr>
       <p:sp>
         <p:nvSpPr>
-          <p:cNvPr id="201" name="Google Shape;201;p27"/>
+          <p:cNvPr id="203" name="Google Shape;203;p27"/>
           <p:cNvSpPr txBox="1"/>
           <p:nvPr>
             <p:ph type="ctrTitle"/>
@@ -10703,7 +10939,7 @@
       </p:sp>
       <p:sp>
         <p:nvSpPr>
-          <p:cNvPr id="202" name="Google Shape;202;p27"/>
+          <p:cNvPr id="204" name="Google Shape;204;p27"/>
           <p:cNvSpPr txBox="1"/>
           <p:nvPr>
             <p:ph idx="1" type="subTitle"/>
@@ -10791,7 +11027,7 @@
       </p:sp>
       <p:sp>
         <p:nvSpPr>
-          <p:cNvPr id="203" name="Google Shape;203;p27"/>
+          <p:cNvPr id="205" name="Google Shape;205;p27"/>
           <p:cNvSpPr txBox="1"/>
           <p:nvPr>
             <p:ph idx="12" type="sldNum"/>
@@ -10842,7 +11078,7 @@
   <p:cSld>
     <p:spTree>
       <p:nvGrpSpPr>
-        <p:cNvPr id="207" name="Shape 207"/>
+        <p:cNvPr id="209" name="Shape 209"/>
         <p:cNvGrpSpPr/>
         <p:nvPr/>
       </p:nvGrpSpPr>
@@ -10856,7 +11092,7 @@
       </p:grpSpPr>
       <p:sp>
         <p:nvSpPr>
-          <p:cNvPr id="208" name="Google Shape;208;p28"/>
+          <p:cNvPr id="210" name="Google Shape;210;p28"/>
           <p:cNvSpPr txBox="1"/>
           <p:nvPr>
             <p:ph idx="12" type="sldNum"/>
@@ -10896,7 +11132,7 @@
       </p:sp>
       <p:sp>
         <p:nvSpPr>
-          <p:cNvPr id="209" name="Google Shape;209;p28"/>
+          <p:cNvPr id="211" name="Google Shape;211;p28"/>
           <p:cNvSpPr txBox="1"/>
           <p:nvPr>
             <p:ph type="ctrTitle"/>
@@ -10936,7 +11172,7 @@
       </p:sp>
       <p:sp>
         <p:nvSpPr>
-          <p:cNvPr id="210" name="Google Shape;210;p28"/>
+          <p:cNvPr id="212" name="Google Shape;212;p28"/>
           <p:cNvSpPr/>
           <p:nvPr/>
         </p:nvSpPr>
@@ -11018,7 +11254,7 @@
   <p:cSld>
     <p:spTree>
       <p:nvGrpSpPr>
-        <p:cNvPr id="214" name="Shape 214"/>
+        <p:cNvPr id="216" name="Shape 216"/>
         <p:cNvGrpSpPr/>
         <p:nvPr/>
       </p:nvGrpSpPr>
@@ -11032,7 +11268,7 @@
       </p:grpSpPr>
       <p:sp>
         <p:nvSpPr>
-          <p:cNvPr id="215" name="Google Shape;215;p29"/>
+          <p:cNvPr id="217" name="Google Shape;217;p29"/>
           <p:cNvSpPr txBox="1"/>
           <p:nvPr>
             <p:ph type="ctrTitle"/>
@@ -11072,7 +11308,7 @@
       </p:sp>
       <p:sp>
         <p:nvSpPr>
-          <p:cNvPr id="216" name="Google Shape;216;p29"/>
+          <p:cNvPr id="218" name="Google Shape;218;p29"/>
           <p:cNvSpPr txBox="1"/>
           <p:nvPr>
             <p:ph idx="1" type="subTitle"/>
@@ -11089,13 +11325,13 @@
         </p:spPr>
         <p:txBody>
           <a:bodyPr anchorCtr="0" anchor="ctr" bIns="91425" lIns="91425" spcFirstLastPara="1" rIns="91425" wrap="square" tIns="91425">
-            <a:normAutofit fontScale="77500" lnSpcReduction="20000"/>
+            <a:normAutofit lnSpcReduction="20000"/>
           </a:bodyPr>
           <a:lstStyle/>
           <a:p>
-            <a:pPr indent="-331946" lvl="0" marL="457200" rtl="0" algn="l">
+            <a:pPr indent="-345598" lvl="0" marL="457200" rtl="0" algn="l">
               <a:lnSpc>
-                <a:spcPct val="150000"/>
+                <a:spcPct val="115000"/>
               </a:lnSpc>
               <a:spcBef>
                 <a:spcPts val="0"/>
@@ -11103,19 +11339,19 @@
               <a:spcAft>
                 <a:spcPts val="0"/>
               </a:spcAft>
-              <a:buSzPct val="100000"/>
+              <a:buSzPts val="1842"/>
               <a:buChar char="●"/>
             </a:pPr>
             <a:r>
-              <a:rPr lang="en"/>
+              <a:rPr lang="en" sz="1842"/>
               <a:t>Optimizing Sentiment Analysis Integration: Explore configurations for improved integration of sentiment analysis and ratings, balancing recommendation accuracy and computational efficiency.</a:t>
             </a:r>
-            <a:endParaRPr/>
-          </a:p>
-          <a:p>
-            <a:pPr indent="-331946" lvl="0" marL="457200" rtl="0" algn="l">
+            <a:endParaRPr sz="1842"/>
+          </a:p>
+          <a:p>
+            <a:pPr indent="-345598" lvl="0" marL="457200" rtl="0" algn="l">
               <a:lnSpc>
-                <a:spcPct val="150000"/>
+                <a:spcPct val="115000"/>
               </a:lnSpc>
               <a:spcBef>
                 <a:spcPts val="0"/>
@@ -11123,19 +11359,19 @@
               <a:spcAft>
                 <a:spcPts val="0"/>
               </a:spcAft>
-              <a:buSzPct val="100000"/>
+              <a:buSzPts val="1842"/>
               <a:buChar char="●"/>
             </a:pPr>
             <a:r>
-              <a:rPr lang="en"/>
+              <a:rPr lang="en" sz="1842"/>
               <a:t>Enhancing Baseline Model: Investigate strategies to reduce convergence times and enhance efficiency in the baseline Simon Funk SVD model.</a:t>
             </a:r>
-            <a:endParaRPr/>
-          </a:p>
-          <a:p>
-            <a:pPr indent="-331946" lvl="0" marL="457200" rtl="0" algn="l">
+            <a:endParaRPr sz="1842"/>
+          </a:p>
+          <a:p>
+            <a:pPr indent="-345598" lvl="0" marL="457200" rtl="0" algn="l">
               <a:lnSpc>
-                <a:spcPct val="150000"/>
+                <a:spcPct val="115000"/>
               </a:lnSpc>
               <a:spcBef>
                 <a:spcPts val="0"/>
@@ -11143,19 +11379,39 @@
               <a:spcAft>
                 <a:spcPts val="0"/>
               </a:spcAft>
-              <a:buSzPct val="100000"/>
+              <a:buSzPts val="1842"/>
               <a:buChar char="●"/>
             </a:pPr>
             <a:r>
-              <a:rPr lang="en"/>
+              <a:rPr lang="en" sz="1842"/>
               <a:t>Advanced Algorithmic Exploration: Consider integrating additional advanced algorithms/models for further performance improvement.</a:t>
             </a:r>
-            <a:endParaRPr/>
+            <a:endParaRPr sz="1842"/>
+          </a:p>
+          <a:p>
+            <a:pPr indent="-345598" lvl="0" marL="457200" rtl="0" algn="l">
+              <a:lnSpc>
+                <a:spcPct val="115000"/>
+              </a:lnSpc>
+              <a:spcBef>
+                <a:spcPts val="0"/>
+              </a:spcBef>
+              <a:spcAft>
+                <a:spcPts val="0"/>
+              </a:spcAft>
+              <a:buSzPts val="1842"/>
+              <a:buChar char="●"/>
+            </a:pPr>
+            <a:r>
+              <a:rPr lang="en" sz="1842"/>
+              <a:t>Real-world Implementation</a:t>
+            </a:r>
+            <a:endParaRPr sz="1842"/>
           </a:p>
           <a:p>
             <a:pPr indent="0" lvl="0" marL="0" rtl="0" algn="l">
               <a:lnSpc>
-                <a:spcPct val="150000"/>
+                <a:spcPct val="115000"/>
               </a:lnSpc>
               <a:spcBef>
                 <a:spcPts val="0"/>
@@ -11163,18 +11419,19 @@
               <a:spcAft>
                 <a:spcPts val="0"/>
               </a:spcAft>
+              <a:buSzPts val="1018"/>
               <a:buNone/>
             </a:pPr>
             <a:r>
               <a:t/>
             </a:r>
-            <a:endParaRPr/>
+            <a:endParaRPr sz="1842"/>
           </a:p>
         </p:txBody>
       </p:sp>
       <p:sp>
         <p:nvSpPr>
-          <p:cNvPr id="217" name="Google Shape;217;p29"/>
+          <p:cNvPr id="219" name="Google Shape;219;p29"/>
           <p:cNvSpPr txBox="1"/>
           <p:nvPr>
             <p:ph idx="12" type="sldNum"/>
@@ -11225,7 +11482,7 @@
   <p:cSld>
     <p:spTree>
       <p:nvGrpSpPr>
-        <p:cNvPr id="221" name="Shape 221"/>
+        <p:cNvPr id="223" name="Shape 223"/>
         <p:cNvGrpSpPr/>
         <p:nvPr/>
       </p:nvGrpSpPr>
@@ -11239,7 +11496,7 @@
       </p:grpSpPr>
       <p:sp>
         <p:nvSpPr>
-          <p:cNvPr id="222" name="Google Shape;222;p30"/>
+          <p:cNvPr id="224" name="Google Shape;224;p30"/>
           <p:cNvSpPr txBox="1"/>
           <p:nvPr>
             <p:ph idx="12" type="sldNum"/>
@@ -11279,7 +11536,7 @@
       </p:sp>
       <p:sp>
         <p:nvSpPr>
-          <p:cNvPr id="223" name="Google Shape;223;p30"/>
+          <p:cNvPr id="225" name="Google Shape;225;p30"/>
           <p:cNvSpPr txBox="1"/>
           <p:nvPr>
             <p:ph type="ctrTitle"/>
@@ -11319,7 +11576,7 @@
       </p:sp>
       <p:sp>
         <p:nvSpPr>
-          <p:cNvPr id="224" name="Google Shape;224;p30"/>
+          <p:cNvPr id="226" name="Google Shape;226;p30"/>
           <p:cNvSpPr/>
           <p:nvPr/>
         </p:nvSpPr>
@@ -11401,7 +11658,7 @@
   <p:cSld>
     <p:spTree>
       <p:nvGrpSpPr>
-        <p:cNvPr id="228" name="Shape 228"/>
+        <p:cNvPr id="230" name="Shape 230"/>
         <p:cNvGrpSpPr/>
         <p:nvPr/>
       </p:nvGrpSpPr>
@@ -11415,7 +11672,7 @@
       </p:grpSpPr>
       <p:sp>
         <p:nvSpPr>
-          <p:cNvPr id="229" name="Google Shape;229;p31"/>
+          <p:cNvPr id="231" name="Google Shape;231;p31"/>
           <p:cNvSpPr txBox="1"/>
           <p:nvPr>
             <p:ph type="ctrTitle"/>
@@ -11455,7 +11712,7 @@
       </p:sp>
       <p:sp>
         <p:nvSpPr>
-          <p:cNvPr id="230" name="Google Shape;230;p31"/>
+          <p:cNvPr id="232" name="Google Shape;232;p31"/>
           <p:cNvSpPr txBox="1"/>
           <p:nvPr>
             <p:ph idx="1" type="subTitle"/>
@@ -11498,7 +11755,7 @@
       </p:sp>
       <p:sp>
         <p:nvSpPr>
-          <p:cNvPr id="231" name="Google Shape;231;p31"/>
+          <p:cNvPr id="233" name="Google Shape;233;p31"/>
           <p:cNvSpPr txBox="1"/>
           <p:nvPr>
             <p:ph idx="12" type="sldNum"/>
@@ -12531,7 +12788,7 @@
   <p:cSld>
     <p:spTree>
       <p:nvGrpSpPr>
-        <p:cNvPr id="235" name="Shape 235"/>
+        <p:cNvPr id="237" name="Shape 237"/>
         <p:cNvGrpSpPr/>
         <p:nvPr/>
       </p:nvGrpSpPr>
@@ -12545,7 +12802,7 @@
       </p:grpSpPr>
       <p:sp>
         <p:nvSpPr>
-          <p:cNvPr id="236" name="Google Shape;236;p32"/>
+          <p:cNvPr id="238" name="Google Shape;238;p32"/>
           <p:cNvSpPr txBox="1"/>
           <p:nvPr>
             <p:ph type="ctrTitle"/>
@@ -12585,7 +12842,7 @@
       </p:sp>
       <p:sp>
         <p:nvSpPr>
-          <p:cNvPr id="237" name="Google Shape;237;p32"/>
+          <p:cNvPr id="239" name="Google Shape;239;p32"/>
           <p:cNvSpPr txBox="1"/>
           <p:nvPr>
             <p:ph idx="12" type="sldNum"/>
@@ -12887,18 +13144,77 @@
           </a:bodyPr>
           <a:lstStyle/>
           <a:p>
-            <a:pPr indent="0" lvl="0" marL="0" rtl="0" algn="just">
-              <a:spcBef>
-                <a:spcPts val="0"/>
-              </a:spcBef>
-              <a:spcAft>
-                <a:spcPts val="0"/>
-              </a:spcAft>
-              <a:buNone/>
+            <a:pPr indent="-342900" lvl="0" marL="457200" rtl="0" algn="l">
+              <a:lnSpc>
+                <a:spcPct val="115000"/>
+              </a:lnSpc>
+              <a:spcBef>
+                <a:spcPts val="0"/>
+              </a:spcBef>
+              <a:spcAft>
+                <a:spcPts val="0"/>
+              </a:spcAft>
+              <a:buSzPts val="1800"/>
+              <a:buChar char="●"/>
             </a:pPr>
             <a:r>
               <a:rPr lang="en" sz="1800"/>
-              <a:t>This research introduces an advanced Recommender System using Natural Language Processing (NLP) and Biased Singular Value Decomposition (SVD). It addresses limitations in existing methods, incorporating controlled bias for enhanced performance, fairness, and transparency. Neural network-driven sequential models further boost efficiency. The goal is to advance recommender systems to be efficient, fair, and transparent, meeting diverse user needs in the digital era.</a:t>
+              <a:t>Introduces a pioneering NLP-based Biased Singular Value Decomposition (SVD) model.</a:t>
+            </a:r>
+            <a:endParaRPr sz="1800"/>
+          </a:p>
+          <a:p>
+            <a:pPr indent="-342900" lvl="0" marL="457200" rtl="0" algn="l">
+              <a:lnSpc>
+                <a:spcPct val="115000"/>
+              </a:lnSpc>
+              <a:spcBef>
+                <a:spcPts val="0"/>
+              </a:spcBef>
+              <a:spcAft>
+                <a:spcPts val="0"/>
+              </a:spcAft>
+              <a:buSzPts val="1800"/>
+              <a:buChar char="●"/>
+            </a:pPr>
+            <a:r>
+              <a:rPr lang="en" sz="1800"/>
+              <a:t>Addresses inherent limitations of existing recommendation methods and offers a unique viewpoint to ensure high-quality recommendations.</a:t>
+            </a:r>
+            <a:endParaRPr sz="1800"/>
+          </a:p>
+          <a:p>
+            <a:pPr indent="-342900" lvl="0" marL="457200" rtl="0" algn="l">
+              <a:lnSpc>
+                <a:spcPct val="115000"/>
+              </a:lnSpc>
+              <a:spcBef>
+                <a:spcPts val="0"/>
+              </a:spcBef>
+              <a:spcAft>
+                <a:spcPts val="0"/>
+              </a:spcAft>
+              <a:buSzPts val="1800"/>
+              <a:buChar char="●"/>
+            </a:pPr>
+            <a:r>
+              <a:rPr lang="en" sz="1800"/>
+              <a:t>Championing Fairness and Transparency: Advocates for fairness and transparency in user-item interactions.</a:t>
+            </a:r>
+            <a:endParaRPr sz="1800"/>
+          </a:p>
+          <a:p>
+            <a:pPr indent="0" lvl="0" marL="0" rtl="0" algn="l">
+              <a:spcBef>
+                <a:spcPts val="0"/>
+              </a:spcBef>
+              <a:spcAft>
+                <a:spcPts val="0"/>
+              </a:spcAft>
+              <a:buNone/>
+            </a:pPr>
+            <a:r>
+              <a:t/>
             </a:r>
             <a:endParaRPr sz="1800"/>
           </a:p>
@@ -13195,8 +13511,8 @@
         </p:nvSpPr>
         <p:spPr>
           <a:xfrm>
-            <a:off x="598100" y="1628001"/>
-            <a:ext cx="8222100" cy="2834100"/>
+            <a:off x="587475" y="1154700"/>
+            <a:ext cx="8222100" cy="3322800"/>
           </a:xfrm>
           <a:prstGeom prst="rect">
             <a:avLst/>
@@ -13204,22 +13520,183 @@
         </p:spPr>
         <p:txBody>
           <a:bodyPr anchorCtr="0" anchor="t" bIns="91425" lIns="91425" spcFirstLastPara="1" rIns="91425" wrap="square" tIns="91425">
-            <a:normAutofit/>
+            <a:noAutofit/>
           </a:bodyPr>
           <a:lstStyle/>
           <a:p>
-            <a:pPr indent="0" lvl="0" marL="0" rtl="0" algn="just">
-              <a:spcBef>
-                <a:spcPts val="0"/>
-              </a:spcBef>
-              <a:spcAft>
-                <a:spcPts val="0"/>
-              </a:spcAft>
-              <a:buNone/>
+            <a:pPr indent="0" lvl="0" marL="0" rtl="0" algn="l">
+              <a:lnSpc>
+                <a:spcPct val="115000"/>
+              </a:lnSpc>
+              <a:spcBef>
+                <a:spcPts val="0"/>
+              </a:spcBef>
+              <a:spcAft>
+                <a:spcPts val="0"/>
+              </a:spcAft>
+              <a:buSzPts val="1018"/>
+              <a:buNone/>
+            </a:pPr>
+            <a:r>
+              <a:t/>
+            </a:r>
+            <a:endParaRPr sz="1800"/>
+          </a:p>
+          <a:p>
+            <a:pPr indent="-342900" lvl="0" marL="457200" rtl="0" algn="l">
+              <a:lnSpc>
+                <a:spcPct val="115000"/>
+              </a:lnSpc>
+              <a:spcBef>
+                <a:spcPts val="0"/>
+              </a:spcBef>
+              <a:spcAft>
+                <a:spcPts val="0"/>
+              </a:spcAft>
+              <a:buSzPts val="1800"/>
+              <a:buChar char="●"/>
             </a:pPr>
             <a:r>
               <a:rPr lang="en" sz="1800"/>
-              <a:t>The paper introduces a novel Natural Language Processing (NLP)-based Biased Singular Value Decomposition (SVD) Recommender System to overcome limitations in existing methods while providing high-quality recommendations. The primary motivation is to leverage advanced NLP techniques and Biased SVD to introduce controlled bias for user and item preferences, enhancing system performance with fairness and transparency.</a:t>
+              <a:t>Exponential Growth of Digital Content</a:t>
+            </a:r>
+            <a:endParaRPr sz="1800"/>
+          </a:p>
+          <a:p>
+            <a:pPr indent="-342900" lvl="0" marL="457200" rtl="0" algn="l">
+              <a:lnSpc>
+                <a:spcPct val="115000"/>
+              </a:lnSpc>
+              <a:spcBef>
+                <a:spcPts val="0"/>
+              </a:spcBef>
+              <a:spcAft>
+                <a:spcPts val="0"/>
+              </a:spcAft>
+              <a:buSzPts val="1800"/>
+              <a:buChar char="●"/>
+            </a:pPr>
+            <a:r>
+              <a:rPr lang="en" sz="1800"/>
+              <a:t>Demand for Personalization</a:t>
+            </a:r>
+            <a:endParaRPr sz="1800"/>
+          </a:p>
+          <a:p>
+            <a:pPr indent="-342900" lvl="0" marL="457200" rtl="0" algn="l">
+              <a:lnSpc>
+                <a:spcPct val="115000"/>
+              </a:lnSpc>
+              <a:spcBef>
+                <a:spcPts val="0"/>
+              </a:spcBef>
+              <a:spcAft>
+                <a:spcPts val="0"/>
+              </a:spcAft>
+              <a:buSzPts val="1800"/>
+              <a:buChar char="●"/>
+            </a:pPr>
+            <a:r>
+              <a:rPr lang="en" sz="1800"/>
+              <a:t>Limitations in Existing Methods</a:t>
+            </a:r>
+            <a:endParaRPr sz="1800"/>
+          </a:p>
+          <a:p>
+            <a:pPr indent="-342900" lvl="0" marL="457200" rtl="0" algn="l">
+              <a:lnSpc>
+                <a:spcPct val="115000"/>
+              </a:lnSpc>
+              <a:spcBef>
+                <a:spcPts val="0"/>
+              </a:spcBef>
+              <a:spcAft>
+                <a:spcPts val="0"/>
+              </a:spcAft>
+              <a:buSzPts val="1800"/>
+              <a:buChar char="●"/>
+            </a:pPr>
+            <a:r>
+              <a:rPr lang="en" sz="1800"/>
+              <a:t>Incorporation of Advanced NLP Techniques</a:t>
+            </a:r>
+            <a:endParaRPr sz="1800"/>
+          </a:p>
+          <a:p>
+            <a:pPr indent="-342900" lvl="0" marL="457200" rtl="0" algn="l">
+              <a:lnSpc>
+                <a:spcPct val="115000"/>
+              </a:lnSpc>
+              <a:spcBef>
+                <a:spcPts val="0"/>
+              </a:spcBef>
+              <a:spcAft>
+                <a:spcPts val="0"/>
+              </a:spcAft>
+              <a:buSzPts val="1800"/>
+              <a:buChar char="●"/>
+            </a:pPr>
+            <a:r>
+              <a:rPr lang="en" sz="1800"/>
+              <a:t>Addressing Challenges of Bias and Fairness</a:t>
+            </a:r>
+            <a:endParaRPr sz="1800"/>
+          </a:p>
+          <a:p>
+            <a:pPr indent="-342900" lvl="0" marL="457200" rtl="0" algn="l">
+              <a:lnSpc>
+                <a:spcPct val="115000"/>
+              </a:lnSpc>
+              <a:spcBef>
+                <a:spcPts val="0"/>
+              </a:spcBef>
+              <a:spcAft>
+                <a:spcPts val="0"/>
+              </a:spcAft>
+              <a:buSzPts val="1800"/>
+              <a:buChar char="●"/>
+            </a:pPr>
+            <a:r>
+              <a:rPr lang="en" sz="1800"/>
+              <a:t>Setting a Benchmark for Efficiency</a:t>
+            </a:r>
+            <a:endParaRPr sz="1800"/>
+          </a:p>
+          <a:p>
+            <a:pPr indent="0" lvl="0" marL="0" rtl="0" algn="l">
+              <a:lnSpc>
+                <a:spcPct val="115000"/>
+              </a:lnSpc>
+              <a:spcBef>
+                <a:spcPts val="0"/>
+              </a:spcBef>
+              <a:spcAft>
+                <a:spcPts val="0"/>
+              </a:spcAft>
+              <a:buSzPts val="1018"/>
+              <a:buNone/>
+            </a:pPr>
+            <a:r>
+              <a:t/>
+            </a:r>
+            <a:endParaRPr sz="1800"/>
+          </a:p>
+          <a:p>
+            <a:pPr indent="0" lvl="0" marL="0" rtl="0" algn="l">
+              <a:lnSpc>
+                <a:spcPct val="115000"/>
+              </a:lnSpc>
+              <a:spcBef>
+                <a:spcPts val="0"/>
+              </a:spcBef>
+              <a:spcAft>
+                <a:spcPts val="0"/>
+              </a:spcAft>
+              <a:buSzPts val="1018"/>
+              <a:buNone/>
+            </a:pPr>
+            <a:r>
+              <a:t/>
             </a:r>
             <a:endParaRPr sz="1800"/>
           </a:p>
@@ -13599,7 +14076,7 @@
             </a:pPr>
             <a:r>
               <a:rPr lang="en" sz="2850"/>
-              <a:t>Advanced NLP Techniques:Leverages NLP for meaningful data analysis</a:t>
+              <a:t>Advanced NLP Techniques: Leverages NLP for meaningful data analysis</a:t>
             </a:r>
             <a:endParaRPr sz="2850"/>
           </a:p>
@@ -13885,6 +14362,285 @@
 </file>
 
 <file path=ppt/theme/theme1.xml><?xml version="1.0" encoding="utf-8"?>
+<a:theme xmlns:a="http://schemas.openxmlformats.org/drawingml/2006/main" xmlns:r="http://schemas.openxmlformats.org/officeDocument/2006/relationships" name="Geometric">
+  <a:themeElements>
+    <a:clrScheme name="Geometric">
+      <a:dk1>
+        <a:srgbClr val="2A3990"/>
+      </a:dk1>
+      <a:lt1>
+        <a:srgbClr val="FFFFFF"/>
+      </a:lt1>
+      <a:dk2>
+        <a:srgbClr val="434343"/>
+      </a:dk2>
+      <a:lt2>
+        <a:srgbClr val="999999"/>
+      </a:lt2>
+      <a:accent1>
+        <a:srgbClr val="212D74"/>
+      </a:accent1>
+      <a:accent2>
+        <a:srgbClr val="3949AB"/>
+      </a:accent2>
+      <a:accent3>
+        <a:srgbClr val="9C254D"/>
+      </a:accent3>
+      <a:accent4>
+        <a:srgbClr val="D23369"/>
+      </a:accent4>
+      <a:accent5>
+        <a:srgbClr val="F06292"/>
+      </a:accent5>
+      <a:accent6>
+        <a:srgbClr val="7890CD"/>
+      </a:accent6>
+      <a:hlink>
+        <a:srgbClr val="F06292"/>
+      </a:hlink>
+      <a:folHlink>
+        <a:srgbClr val="F06292"/>
+      </a:folHlink>
+    </a:clrScheme>
+    <a:fontScheme name="Office">
+      <a:majorFont>
+        <a:latin typeface="Arial"/>
+        <a:ea typeface=""/>
+        <a:cs typeface=""/>
+        <a:font script="Jpan" typeface="ＭＳ Ｐゴシック"/>
+        <a:font script="Hang" typeface="맑은 고딕"/>
+        <a:font script="Hans" typeface="宋体"/>
+        <a:font script="Hant" typeface="新細明體"/>
+        <a:font script="Arab" typeface="Times New Roman"/>
+        <a:font script="Hebr" typeface="Times New Roman"/>
+        <a:font script="Thai" typeface="Angsana New"/>
+        <a:font script="Ethi" typeface="Nyala"/>
+        <a:font script="Beng" typeface="Vrinda"/>
+        <a:font script="Gujr" typeface="Shruti"/>
+        <a:font script="Khmr" typeface="MoolBoran"/>
+        <a:font script="Knda" typeface="Tunga"/>
+        <a:font script="Guru" typeface="Raavi"/>
+        <a:font script="Cans" typeface="Euphemia"/>
+        <a:font script="Cher" typeface="Plantagenet Cherokee"/>
+        <a:font script="Yiii" typeface="Microsoft Yi Baiti"/>
+        <a:font script="Tibt" typeface="Microsoft Himalaya"/>
+        <a:font script="Thaa" typeface="MV Boli"/>
+        <a:font script="Deva" typeface="Mangal"/>
+        <a:font script="Telu" typeface="Gautami"/>
+        <a:font script="Taml" typeface="Latha"/>
+        <a:font script="Syrc" typeface="Estrangelo Edessa"/>
+        <a:font script="Orya" typeface="Kalinga"/>
+        <a:font script="Mlym" typeface="Kartika"/>
+        <a:font script="Laoo" typeface="DokChampa"/>
+        <a:font script="Sinh" typeface="Iskoola Pota"/>
+        <a:font script="Mong" typeface="Mongolian Baiti"/>
+        <a:font script="Viet" typeface="Times New Roman"/>
+        <a:font script="Uigh" typeface="Microsoft Uighur"/>
+        <a:font script="Geor" typeface="Sylfaen"/>
+      </a:majorFont>
+      <a:minorFont>
+        <a:latin typeface="Arial"/>
+        <a:ea typeface=""/>
+        <a:cs typeface=""/>
+        <a:font script="Jpan" typeface="ＭＳ Ｐゴシック"/>
+        <a:font script="Hang" typeface="맑은 고딕"/>
+        <a:font script="Hans" typeface="宋体"/>
+        <a:font script="Hant" typeface="新細明體"/>
+        <a:font script="Arab" typeface="Arial"/>
+        <a:font script="Hebr" typeface="Arial"/>
+        <a:font script="Thai" typeface="Cordia New"/>
+        <a:font script="Ethi" typeface="Nyala"/>
+        <a:font script="Beng" typeface="Vrinda"/>
+        <a:font script="Gujr" typeface="Shruti"/>
+        <a:font script="Khmr" typeface="DaunPenh"/>
+        <a:font script="Knda" typeface="Tunga"/>
+        <a:font script="Guru" typeface="Raavi"/>
+        <a:font script="Cans" typeface="Euphemia"/>
+        <a:font script="Cher" typeface="Plantagenet Cherokee"/>
+        <a:font script="Yiii" typeface="Microsoft Yi Baiti"/>
+        <a:font script="Tibt" typeface="Microsoft Himalaya"/>
+        <a:font script="Thaa" typeface="MV Boli"/>
+        <a:font script="Deva" typeface="Mangal"/>
+        <a:font script="Telu" typeface="Gautami"/>
+        <a:font script="Taml" typeface="Latha"/>
+        <a:font script="Syrc" typeface="Estrangelo Edessa"/>
+        <a:font script="Orya" typeface="Kalinga"/>
+        <a:font script="Mlym" typeface="Kartika"/>
+        <a:font script="Laoo" typeface="DokChampa"/>
+        <a:font script="Sinh" typeface="Iskoola Pota"/>
+        <a:font script="Mong" typeface="Mongolian Baiti"/>
+        <a:font script="Viet" typeface="Arial"/>
+        <a:font script="Uigh" typeface="Microsoft Uighur"/>
+        <a:font script="Geor" typeface="Sylfaen"/>
+      </a:minorFont>
+    </a:fontScheme>
+    <a:fmtScheme name="Office">
+      <a:fillStyleLst>
+        <a:solidFill>
+          <a:schemeClr val="phClr"/>
+        </a:solidFill>
+        <a:gradFill rotWithShape="1">
+          <a:gsLst>
+            <a:gs pos="0">
+              <a:schemeClr val="phClr">
+                <a:tint val="50000"/>
+                <a:satMod val="300000"/>
+              </a:schemeClr>
+            </a:gs>
+            <a:gs pos="35000">
+              <a:schemeClr val="phClr">
+                <a:tint val="37000"/>
+                <a:satMod val="300000"/>
+              </a:schemeClr>
+            </a:gs>
+            <a:gs pos="100000">
+              <a:schemeClr val="phClr">
+                <a:tint val="15000"/>
+                <a:satMod val="350000"/>
+              </a:schemeClr>
+            </a:gs>
+          </a:gsLst>
+          <a:lin ang="16200000" scaled="1"/>
+        </a:gradFill>
+        <a:gradFill rotWithShape="1">
+          <a:gsLst>
+            <a:gs pos="0">
+              <a:schemeClr val="phClr">
+                <a:tint val="100000"/>
+                <a:shade val="100000"/>
+                <a:satMod val="130000"/>
+              </a:schemeClr>
+            </a:gs>
+            <a:gs pos="100000">
+              <a:schemeClr val="phClr">
+                <a:tint val="50000"/>
+                <a:shade val="100000"/>
+                <a:satMod val="350000"/>
+              </a:schemeClr>
+            </a:gs>
+          </a:gsLst>
+          <a:lin ang="16200000" scaled="0"/>
+        </a:gradFill>
+      </a:fillStyleLst>
+      <a:lnStyleLst>
+        <a:ln w="9525" cap="flat" cmpd="sng" algn="ctr">
+          <a:solidFill>
+            <a:schemeClr val="phClr">
+              <a:shade val="95000"/>
+              <a:satMod val="105000"/>
+            </a:schemeClr>
+          </a:solidFill>
+          <a:prstDash val="solid"/>
+        </a:ln>
+        <a:ln w="25400" cap="flat" cmpd="sng" algn="ctr">
+          <a:solidFill>
+            <a:schemeClr val="phClr"/>
+          </a:solidFill>
+          <a:prstDash val="solid"/>
+        </a:ln>
+        <a:ln w="38100" cap="flat" cmpd="sng" algn="ctr">
+          <a:solidFill>
+            <a:schemeClr val="phClr"/>
+          </a:solidFill>
+          <a:prstDash val="solid"/>
+        </a:ln>
+      </a:lnStyleLst>
+      <a:effectStyleLst>
+        <a:effectStyle>
+          <a:effectLst>
+            <a:outerShdw blurRad="40000" dist="20000" dir="5400000" rotWithShape="0">
+              <a:srgbClr val="000000">
+                <a:alpha val="38000"/>
+              </a:srgbClr>
+            </a:outerShdw>
+          </a:effectLst>
+        </a:effectStyle>
+        <a:effectStyle>
+          <a:effectLst>
+            <a:outerShdw blurRad="40000" dist="23000" dir="5400000" rotWithShape="0">
+              <a:srgbClr val="000000">
+                <a:alpha val="35000"/>
+              </a:srgbClr>
+            </a:outerShdw>
+          </a:effectLst>
+        </a:effectStyle>
+        <a:effectStyle>
+          <a:effectLst>
+            <a:outerShdw blurRad="40000" dist="23000" dir="5400000" rotWithShape="0">
+              <a:srgbClr val="000000">
+                <a:alpha val="35000"/>
+              </a:srgbClr>
+            </a:outerShdw>
+          </a:effectLst>
+          <a:scene3d>
+            <a:camera prst="orthographicFront">
+              <a:rot lat="0" lon="0" rev="0"/>
+            </a:camera>
+            <a:lightRig rig="threePt" dir="t">
+              <a:rot lat="0" lon="0" rev="1200000"/>
+            </a:lightRig>
+          </a:scene3d>
+          <a:sp3d>
+            <a:bevelT w="63500" h="25400"/>
+          </a:sp3d>
+        </a:effectStyle>
+      </a:effectStyleLst>
+      <a:bgFillStyleLst>
+        <a:solidFill>
+          <a:schemeClr val="phClr"/>
+        </a:solidFill>
+        <a:gradFill rotWithShape="1">
+          <a:gsLst>
+            <a:gs pos="0">
+              <a:schemeClr val="phClr">
+                <a:tint val="40000"/>
+                <a:satMod val="350000"/>
+              </a:schemeClr>
+            </a:gs>
+            <a:gs pos="40000">
+              <a:schemeClr val="phClr">
+                <a:tint val="45000"/>
+                <a:shade val="99000"/>
+                <a:satMod val="350000"/>
+              </a:schemeClr>
+            </a:gs>
+            <a:gs pos="100000">
+              <a:schemeClr val="phClr">
+                <a:shade val="20000"/>
+                <a:satMod val="255000"/>
+              </a:schemeClr>
+            </a:gs>
+          </a:gsLst>
+          <a:path path="circle">
+            <a:fillToRect l="50000" t="-80000" r="50000" b="180000"/>
+          </a:path>
+        </a:gradFill>
+        <a:gradFill rotWithShape="1">
+          <a:gsLst>
+            <a:gs pos="0">
+              <a:schemeClr val="phClr">
+                <a:tint val="80000"/>
+                <a:satMod val="300000"/>
+              </a:schemeClr>
+            </a:gs>
+            <a:gs pos="100000">
+              <a:schemeClr val="phClr">
+                <a:shade val="30000"/>
+                <a:satMod val="200000"/>
+              </a:schemeClr>
+            </a:gs>
+          </a:gsLst>
+          <a:path path="circle">
+            <a:fillToRect l="50000" t="50000" r="50000" b="50000"/>
+          </a:path>
+        </a:gradFill>
+      </a:bgFillStyleLst>
+    </a:fmtScheme>
+  </a:themeElements>
+</a:theme>
+</file>
+
+<file path=ppt/theme/theme2.xml><?xml version="1.0" encoding="utf-8"?>
 <a:theme xmlns:a="http://schemas.openxmlformats.org/drawingml/2006/main" xmlns:r="http://schemas.openxmlformats.org/officeDocument/2006/relationships">
   <a:themeElements>
     <a:clrScheme name="Default">
@@ -14161,283 +14917,4 @@
     </a:fmtScheme>
   </a:themeElements>
 </a:theme>
-</file>
-
-<file path=ppt/theme/theme2.xml><?xml version="1.0" encoding="utf-8"?>
-<a:theme xmlns:a="http://schemas.openxmlformats.org/drawingml/2006/main" xmlns:r="http://schemas.openxmlformats.org/officeDocument/2006/relationships" name="Geometric">
-  <a:themeElements>
-    <a:clrScheme name="Geometric">
-      <a:dk1>
-        <a:srgbClr val="2A3990"/>
-      </a:dk1>
-      <a:lt1>
-        <a:srgbClr val="FFFFFF"/>
-      </a:lt1>
-      <a:dk2>
-        <a:srgbClr val="434343"/>
-      </a:dk2>
-      <a:lt2>
-        <a:srgbClr val="999999"/>
-      </a:lt2>
-      <a:accent1>
-        <a:srgbClr val="212D74"/>
-      </a:accent1>
-      <a:accent2>
-        <a:srgbClr val="3949AB"/>
-      </a:accent2>
-      <a:accent3>
-        <a:srgbClr val="9C254D"/>
-      </a:accent3>
-      <a:accent4>
-        <a:srgbClr val="D23369"/>
-      </a:accent4>
-      <a:accent5>
-        <a:srgbClr val="F06292"/>
-      </a:accent5>
-      <a:accent6>
-        <a:srgbClr val="7890CD"/>
-      </a:accent6>
-      <a:hlink>
-        <a:srgbClr val="F06292"/>
-      </a:hlink>
-      <a:folHlink>
-        <a:srgbClr val="F06292"/>
-      </a:folHlink>
-    </a:clrScheme>
-    <a:fontScheme name="Office">
-      <a:majorFont>
-        <a:latin typeface="Arial"/>
-        <a:ea typeface=""/>
-        <a:cs typeface=""/>
-        <a:font script="Jpan" typeface="ＭＳ Ｐゴシック"/>
-        <a:font script="Hang" typeface="맑은 고딕"/>
-        <a:font script="Hans" typeface="宋体"/>
-        <a:font script="Hant" typeface="新細明體"/>
-        <a:font script="Arab" typeface="Times New Roman"/>
-        <a:font script="Hebr" typeface="Times New Roman"/>
-        <a:font script="Thai" typeface="Angsana New"/>
-        <a:font script="Ethi" typeface="Nyala"/>
-        <a:font script="Beng" typeface="Vrinda"/>
-        <a:font script="Gujr" typeface="Shruti"/>
-        <a:font script="Khmr" typeface="MoolBoran"/>
-        <a:font script="Knda" typeface="Tunga"/>
-        <a:font script="Guru" typeface="Raavi"/>
-        <a:font script="Cans" typeface="Euphemia"/>
-        <a:font script="Cher" typeface="Plantagenet Cherokee"/>
-        <a:font script="Yiii" typeface="Microsoft Yi Baiti"/>
-        <a:font script="Tibt" typeface="Microsoft Himalaya"/>
-        <a:font script="Thaa" typeface="MV Boli"/>
-        <a:font script="Deva" typeface="Mangal"/>
-        <a:font script="Telu" typeface="Gautami"/>
-        <a:font script="Taml" typeface="Latha"/>
-        <a:font script="Syrc" typeface="Estrangelo Edessa"/>
-        <a:font script="Orya" typeface="Kalinga"/>
-        <a:font script="Mlym" typeface="Kartika"/>
-        <a:font script="Laoo" typeface="DokChampa"/>
-        <a:font script="Sinh" typeface="Iskoola Pota"/>
-        <a:font script="Mong" typeface="Mongolian Baiti"/>
-        <a:font script="Viet" typeface="Times New Roman"/>
-        <a:font script="Uigh" typeface="Microsoft Uighur"/>
-        <a:font script="Geor" typeface="Sylfaen"/>
-      </a:majorFont>
-      <a:minorFont>
-        <a:latin typeface="Arial"/>
-        <a:ea typeface=""/>
-        <a:cs typeface=""/>
-        <a:font script="Jpan" typeface="ＭＳ Ｐゴシック"/>
-        <a:font script="Hang" typeface="맑은 고딕"/>
-        <a:font script="Hans" typeface="宋体"/>
-        <a:font script="Hant" typeface="新細明體"/>
-        <a:font script="Arab" typeface="Arial"/>
-        <a:font script="Hebr" typeface="Arial"/>
-        <a:font script="Thai" typeface="Cordia New"/>
-        <a:font script="Ethi" typeface="Nyala"/>
-        <a:font script="Beng" typeface="Vrinda"/>
-        <a:font script="Gujr" typeface="Shruti"/>
-        <a:font script="Khmr" typeface="DaunPenh"/>
-        <a:font script="Knda" typeface="Tunga"/>
-        <a:font script="Guru" typeface="Raavi"/>
-        <a:font script="Cans" typeface="Euphemia"/>
-        <a:font script="Cher" typeface="Plantagenet Cherokee"/>
-        <a:font script="Yiii" typeface="Microsoft Yi Baiti"/>
-        <a:font script="Tibt" typeface="Microsoft Himalaya"/>
-        <a:font script="Thaa" typeface="MV Boli"/>
-        <a:font script="Deva" typeface="Mangal"/>
-        <a:font script="Telu" typeface="Gautami"/>
-        <a:font script="Taml" typeface="Latha"/>
-        <a:font script="Syrc" typeface="Estrangelo Edessa"/>
-        <a:font script="Orya" typeface="Kalinga"/>
-        <a:font script="Mlym" typeface="Kartika"/>
-        <a:font script="Laoo" typeface="DokChampa"/>
-        <a:font script="Sinh" typeface="Iskoola Pota"/>
-        <a:font script="Mong" typeface="Mongolian Baiti"/>
-        <a:font script="Viet" typeface="Arial"/>
-        <a:font script="Uigh" typeface="Microsoft Uighur"/>
-        <a:font script="Geor" typeface="Sylfaen"/>
-      </a:minorFont>
-    </a:fontScheme>
-    <a:fmtScheme name="Office">
-      <a:fillStyleLst>
-        <a:solidFill>
-          <a:schemeClr val="phClr"/>
-        </a:solidFill>
-        <a:gradFill rotWithShape="1">
-          <a:gsLst>
-            <a:gs pos="0">
-              <a:schemeClr val="phClr">
-                <a:tint val="50000"/>
-                <a:satMod val="300000"/>
-              </a:schemeClr>
-            </a:gs>
-            <a:gs pos="35000">
-              <a:schemeClr val="phClr">
-                <a:tint val="37000"/>
-                <a:satMod val="300000"/>
-              </a:schemeClr>
-            </a:gs>
-            <a:gs pos="100000">
-              <a:schemeClr val="phClr">
-                <a:tint val="15000"/>
-                <a:satMod val="350000"/>
-              </a:schemeClr>
-            </a:gs>
-          </a:gsLst>
-          <a:lin ang="16200000" scaled="1"/>
-        </a:gradFill>
-        <a:gradFill rotWithShape="1">
-          <a:gsLst>
-            <a:gs pos="0">
-              <a:schemeClr val="phClr">
-                <a:tint val="100000"/>
-                <a:shade val="100000"/>
-                <a:satMod val="130000"/>
-              </a:schemeClr>
-            </a:gs>
-            <a:gs pos="100000">
-              <a:schemeClr val="phClr">
-                <a:tint val="50000"/>
-                <a:shade val="100000"/>
-                <a:satMod val="350000"/>
-              </a:schemeClr>
-            </a:gs>
-          </a:gsLst>
-          <a:lin ang="16200000" scaled="0"/>
-        </a:gradFill>
-      </a:fillStyleLst>
-      <a:lnStyleLst>
-        <a:ln w="9525" cap="flat" cmpd="sng" algn="ctr">
-          <a:solidFill>
-            <a:schemeClr val="phClr">
-              <a:shade val="95000"/>
-              <a:satMod val="105000"/>
-            </a:schemeClr>
-          </a:solidFill>
-          <a:prstDash val="solid"/>
-        </a:ln>
-        <a:ln w="25400" cap="flat" cmpd="sng" algn="ctr">
-          <a:solidFill>
-            <a:schemeClr val="phClr"/>
-          </a:solidFill>
-          <a:prstDash val="solid"/>
-        </a:ln>
-        <a:ln w="38100" cap="flat" cmpd="sng" algn="ctr">
-          <a:solidFill>
-            <a:schemeClr val="phClr"/>
-          </a:solidFill>
-          <a:prstDash val="solid"/>
-        </a:ln>
-      </a:lnStyleLst>
-      <a:effectStyleLst>
-        <a:effectStyle>
-          <a:effectLst>
-            <a:outerShdw blurRad="40000" dist="20000" dir="5400000" rotWithShape="0">
-              <a:srgbClr val="000000">
-                <a:alpha val="38000"/>
-              </a:srgbClr>
-            </a:outerShdw>
-          </a:effectLst>
-        </a:effectStyle>
-        <a:effectStyle>
-          <a:effectLst>
-            <a:outerShdw blurRad="40000" dist="23000" dir="5400000" rotWithShape="0">
-              <a:srgbClr val="000000">
-                <a:alpha val="35000"/>
-              </a:srgbClr>
-            </a:outerShdw>
-          </a:effectLst>
-        </a:effectStyle>
-        <a:effectStyle>
-          <a:effectLst>
-            <a:outerShdw blurRad="40000" dist="23000" dir="5400000" rotWithShape="0">
-              <a:srgbClr val="000000">
-                <a:alpha val="35000"/>
-              </a:srgbClr>
-            </a:outerShdw>
-          </a:effectLst>
-          <a:scene3d>
-            <a:camera prst="orthographicFront">
-              <a:rot lat="0" lon="0" rev="0"/>
-            </a:camera>
-            <a:lightRig rig="threePt" dir="t">
-              <a:rot lat="0" lon="0" rev="1200000"/>
-            </a:lightRig>
-          </a:scene3d>
-          <a:sp3d>
-            <a:bevelT w="63500" h="25400"/>
-          </a:sp3d>
-        </a:effectStyle>
-      </a:effectStyleLst>
-      <a:bgFillStyleLst>
-        <a:solidFill>
-          <a:schemeClr val="phClr"/>
-        </a:solidFill>
-        <a:gradFill rotWithShape="1">
-          <a:gsLst>
-            <a:gs pos="0">
-              <a:schemeClr val="phClr">
-                <a:tint val="40000"/>
-                <a:satMod val="350000"/>
-              </a:schemeClr>
-            </a:gs>
-            <a:gs pos="40000">
-              <a:schemeClr val="phClr">
-                <a:tint val="45000"/>
-                <a:shade val="99000"/>
-                <a:satMod val="350000"/>
-              </a:schemeClr>
-            </a:gs>
-            <a:gs pos="100000">
-              <a:schemeClr val="phClr">
-                <a:shade val="20000"/>
-                <a:satMod val="255000"/>
-              </a:schemeClr>
-            </a:gs>
-          </a:gsLst>
-          <a:path path="circle">
-            <a:fillToRect l="50000" t="-80000" r="50000" b="180000"/>
-          </a:path>
-        </a:gradFill>
-        <a:gradFill rotWithShape="1">
-          <a:gsLst>
-            <a:gs pos="0">
-              <a:schemeClr val="phClr">
-                <a:tint val="80000"/>
-                <a:satMod val="300000"/>
-              </a:schemeClr>
-            </a:gs>
-            <a:gs pos="100000">
-              <a:schemeClr val="phClr">
-                <a:shade val="30000"/>
-                <a:satMod val="200000"/>
-              </a:schemeClr>
-            </a:gs>
-          </a:gsLst>
-          <a:path path="circle">
-            <a:fillToRect l="50000" t="50000" r="50000" b="50000"/>
-          </a:path>
-        </a:gradFill>
-      </a:bgFillStyleLst>
-    </a:fmtScheme>
-  </a:themeElements>
-</a:theme>
 </file>
</xml_diff>